<commit_message>
updated Q2 models and plots
</commit_message>
<xml_diff>
--- a/figures/parent_effects_H2F/Q2_Length_Slopes.pptx
+++ b/figures/parent_effects_H2F/Q2_Length_Slopes.pptx
@@ -4,6 +4,9 @@
   <p:sldMasterIdLst>
     <p:sldMasterId id="2147483696" r:id="rId1"/>
   </p:sldMasterIdLst>
+  <p:notesMasterIdLst>
+    <p:notesMasterId r:id="rId3"/>
+  </p:notesMasterIdLst>
   <p:sldIdLst>
     <p:sldId id="256" r:id="rId2"/>
   </p:sldIdLst>
@@ -112,6 +115,442 @@
 </p:presentation>
 </file>
 
+<file path=ppt/notesMasters/notesMaster1.xml><?xml version="1.0" encoding="utf-8"?>
+<p:notesMaster xmlns:a="http://schemas.openxmlformats.org/drawingml/2006/main" xmlns:r="http://schemas.openxmlformats.org/officeDocument/2006/relationships" xmlns:p="http://schemas.openxmlformats.org/presentationml/2006/main">
+  <p:cSld>
+    <p:bg>
+      <p:bgRef idx="1001">
+        <a:schemeClr val="bg1"/>
+      </p:bgRef>
+    </p:bg>
+    <p:spTree>
+      <p:nvGrpSpPr>
+        <p:cNvPr id="1" name=""/>
+        <p:cNvGrpSpPr/>
+        <p:nvPr/>
+      </p:nvGrpSpPr>
+      <p:grpSpPr>
+        <a:xfrm>
+          <a:off x="0" y="0"/>
+          <a:ext cx="0" cy="0"/>
+          <a:chOff x="0" y="0"/>
+          <a:chExt cx="0" cy="0"/>
+        </a:xfrm>
+      </p:grpSpPr>
+      <p:sp>
+        <p:nvSpPr>
+          <p:cNvPr id="2" name="Header Placeholder 1"/>
+          <p:cNvSpPr>
+            <a:spLocks noGrp="1"/>
+          </p:cNvSpPr>
+          <p:nvPr>
+            <p:ph type="hdr" sz="quarter"/>
+          </p:nvPr>
+        </p:nvSpPr>
+        <p:spPr>
+          <a:xfrm>
+            <a:off x="0" y="0"/>
+            <a:ext cx="2971800" cy="458788"/>
+          </a:xfrm>
+          <a:prstGeom prst="rect">
+            <a:avLst/>
+          </a:prstGeom>
+        </p:spPr>
+        <p:txBody>
+          <a:bodyPr vert="horz" lIns="91440" tIns="45720" rIns="91440" bIns="45720" rtlCol="0"/>
+          <a:lstStyle>
+            <a:lvl1pPr algn="l">
+              <a:defRPr sz="1200"/>
+            </a:lvl1pPr>
+          </a:lstStyle>
+          <a:p>
+            <a:endParaRPr lang="en-US"/>
+          </a:p>
+        </p:txBody>
+      </p:sp>
+      <p:sp>
+        <p:nvSpPr>
+          <p:cNvPr id="3" name="Date Placeholder 2"/>
+          <p:cNvSpPr>
+            <a:spLocks noGrp="1"/>
+          </p:cNvSpPr>
+          <p:nvPr>
+            <p:ph type="dt" idx="1"/>
+          </p:nvPr>
+        </p:nvSpPr>
+        <p:spPr>
+          <a:xfrm>
+            <a:off x="3884613" y="0"/>
+            <a:ext cx="2971800" cy="458788"/>
+          </a:xfrm>
+          <a:prstGeom prst="rect">
+            <a:avLst/>
+          </a:prstGeom>
+        </p:spPr>
+        <p:txBody>
+          <a:bodyPr vert="horz" lIns="91440" tIns="45720" rIns="91440" bIns="45720" rtlCol="0"/>
+          <a:lstStyle>
+            <a:lvl1pPr algn="r">
+              <a:defRPr sz="1200"/>
+            </a:lvl1pPr>
+          </a:lstStyle>
+          <a:p>
+            <a:fld id="{7F5E9E7E-1A09-EC49-8954-EA36632E00AC}" type="datetimeFigureOut">
+              <a:rPr lang="en-US" smtClean="0"/>
+              <a:t>11/24/25</a:t>
+            </a:fld>
+            <a:endParaRPr lang="en-US"/>
+          </a:p>
+        </p:txBody>
+      </p:sp>
+      <p:sp>
+        <p:nvSpPr>
+          <p:cNvPr id="4" name="Slide Image Placeholder 3"/>
+          <p:cNvSpPr>
+            <a:spLocks noGrp="1" noRot="1" noChangeAspect="1"/>
+          </p:cNvSpPr>
+          <p:nvPr>
+            <p:ph type="sldImg" idx="2"/>
+          </p:nvPr>
+        </p:nvSpPr>
+        <p:spPr>
+          <a:xfrm>
+            <a:off x="1143000" y="1143000"/>
+            <a:ext cx="4572000" cy="3086100"/>
+          </a:xfrm>
+          <a:prstGeom prst="rect">
+            <a:avLst/>
+          </a:prstGeom>
+          <a:noFill/>
+          <a:ln w="12700">
+            <a:solidFill>
+              <a:prstClr val="black"/>
+            </a:solidFill>
+          </a:ln>
+        </p:spPr>
+        <p:txBody>
+          <a:bodyPr vert="horz" lIns="91440" tIns="45720" rIns="91440" bIns="45720" rtlCol="0" anchor="ctr"/>
+          <a:lstStyle/>
+          <a:p>
+            <a:endParaRPr lang="en-US"/>
+          </a:p>
+        </p:txBody>
+      </p:sp>
+      <p:sp>
+        <p:nvSpPr>
+          <p:cNvPr id="5" name="Notes Placeholder 4"/>
+          <p:cNvSpPr>
+            <a:spLocks noGrp="1"/>
+          </p:cNvSpPr>
+          <p:nvPr>
+            <p:ph type="body" sz="quarter" idx="3"/>
+          </p:nvPr>
+        </p:nvSpPr>
+        <p:spPr>
+          <a:xfrm>
+            <a:off x="685800" y="4400550"/>
+            <a:ext cx="5486400" cy="3600450"/>
+          </a:xfrm>
+          <a:prstGeom prst="rect">
+            <a:avLst/>
+          </a:prstGeom>
+        </p:spPr>
+        <p:txBody>
+          <a:bodyPr vert="horz" lIns="91440" tIns="45720" rIns="91440" bIns="45720" rtlCol="0"/>
+          <a:lstStyle/>
+          <a:p>
+            <a:pPr lvl="0"/>
+            <a:r>
+              <a:rPr lang="en-US"/>
+              <a:t>Click to edit Master text styles</a:t>
+            </a:r>
+          </a:p>
+          <a:p>
+            <a:pPr lvl="1"/>
+            <a:r>
+              <a:rPr lang="en-US"/>
+              <a:t>Second level</a:t>
+            </a:r>
+          </a:p>
+          <a:p>
+            <a:pPr lvl="2"/>
+            <a:r>
+              <a:rPr lang="en-US"/>
+              <a:t>Third level</a:t>
+            </a:r>
+          </a:p>
+          <a:p>
+            <a:pPr lvl="3"/>
+            <a:r>
+              <a:rPr lang="en-US"/>
+              <a:t>Fourth level</a:t>
+            </a:r>
+          </a:p>
+          <a:p>
+            <a:pPr lvl="4"/>
+            <a:r>
+              <a:rPr lang="en-US"/>
+              <a:t>Fifth level</a:t>
+            </a:r>
+          </a:p>
+        </p:txBody>
+      </p:sp>
+      <p:sp>
+        <p:nvSpPr>
+          <p:cNvPr id="6" name="Footer Placeholder 5"/>
+          <p:cNvSpPr>
+            <a:spLocks noGrp="1"/>
+          </p:cNvSpPr>
+          <p:nvPr>
+            <p:ph type="ftr" sz="quarter" idx="4"/>
+          </p:nvPr>
+        </p:nvSpPr>
+        <p:spPr>
+          <a:xfrm>
+            <a:off x="0" y="8685213"/>
+            <a:ext cx="2971800" cy="458787"/>
+          </a:xfrm>
+          <a:prstGeom prst="rect">
+            <a:avLst/>
+          </a:prstGeom>
+        </p:spPr>
+        <p:txBody>
+          <a:bodyPr vert="horz" lIns="91440" tIns="45720" rIns="91440" bIns="45720" rtlCol="0" anchor="b"/>
+          <a:lstStyle>
+            <a:lvl1pPr algn="l">
+              <a:defRPr sz="1200"/>
+            </a:lvl1pPr>
+          </a:lstStyle>
+          <a:p>
+            <a:endParaRPr lang="en-US"/>
+          </a:p>
+        </p:txBody>
+      </p:sp>
+      <p:sp>
+        <p:nvSpPr>
+          <p:cNvPr id="7" name="Slide Number Placeholder 6"/>
+          <p:cNvSpPr>
+            <a:spLocks noGrp="1"/>
+          </p:cNvSpPr>
+          <p:nvPr>
+            <p:ph type="sldNum" sz="quarter" idx="5"/>
+          </p:nvPr>
+        </p:nvSpPr>
+        <p:spPr>
+          <a:xfrm>
+            <a:off x="3884613" y="8685213"/>
+            <a:ext cx="2971800" cy="458787"/>
+          </a:xfrm>
+          <a:prstGeom prst="rect">
+            <a:avLst/>
+          </a:prstGeom>
+        </p:spPr>
+        <p:txBody>
+          <a:bodyPr vert="horz" lIns="91440" tIns="45720" rIns="91440" bIns="45720" rtlCol="0" anchor="b"/>
+          <a:lstStyle>
+            <a:lvl1pPr algn="r">
+              <a:defRPr sz="1200"/>
+            </a:lvl1pPr>
+          </a:lstStyle>
+          <a:p>
+            <a:fld id="{50893031-D579-1144-BE45-5A6B0EDFBF8E}" type="slidenum">
+              <a:rPr lang="en-US" smtClean="0"/>
+              <a:t>‹#›</a:t>
+            </a:fld>
+            <a:endParaRPr lang="en-US"/>
+          </a:p>
+        </p:txBody>
+      </p:sp>
+    </p:spTree>
+    <p:extLst>
+      <p:ext uri="{BB962C8B-B14F-4D97-AF65-F5344CB8AC3E}">
+        <p14:creationId xmlns:p14="http://schemas.microsoft.com/office/powerpoint/2010/main" val="1003996519"/>
+      </p:ext>
+    </p:extLst>
+  </p:cSld>
+  <p:clrMap bg1="lt1" tx1="dk1" bg2="lt2" tx2="dk2" accent1="accent1" accent2="accent2" accent3="accent3" accent4="accent4" accent5="accent5" accent6="accent6" hlink="hlink" folHlink="folHlink"/>
+  <p:notesStyle>
+    <a:lvl1pPr marL="0" algn="l" defTabSz="914400" rtl="0" eaLnBrk="1" latinLnBrk="0" hangingPunct="1">
+      <a:defRPr sz="1200" kern="1200">
+        <a:solidFill>
+          <a:schemeClr val="tx1"/>
+        </a:solidFill>
+        <a:latin typeface="+mn-lt"/>
+        <a:ea typeface="+mn-ea"/>
+        <a:cs typeface="+mn-cs"/>
+      </a:defRPr>
+    </a:lvl1pPr>
+    <a:lvl2pPr marL="457200" algn="l" defTabSz="914400" rtl="0" eaLnBrk="1" latinLnBrk="0" hangingPunct="1">
+      <a:defRPr sz="1200" kern="1200">
+        <a:solidFill>
+          <a:schemeClr val="tx1"/>
+        </a:solidFill>
+        <a:latin typeface="+mn-lt"/>
+        <a:ea typeface="+mn-ea"/>
+        <a:cs typeface="+mn-cs"/>
+      </a:defRPr>
+    </a:lvl2pPr>
+    <a:lvl3pPr marL="914400" algn="l" defTabSz="914400" rtl="0" eaLnBrk="1" latinLnBrk="0" hangingPunct="1">
+      <a:defRPr sz="1200" kern="1200">
+        <a:solidFill>
+          <a:schemeClr val="tx1"/>
+        </a:solidFill>
+        <a:latin typeface="+mn-lt"/>
+        <a:ea typeface="+mn-ea"/>
+        <a:cs typeface="+mn-cs"/>
+      </a:defRPr>
+    </a:lvl3pPr>
+    <a:lvl4pPr marL="1371600" algn="l" defTabSz="914400" rtl="0" eaLnBrk="1" latinLnBrk="0" hangingPunct="1">
+      <a:defRPr sz="1200" kern="1200">
+        <a:solidFill>
+          <a:schemeClr val="tx1"/>
+        </a:solidFill>
+        <a:latin typeface="+mn-lt"/>
+        <a:ea typeface="+mn-ea"/>
+        <a:cs typeface="+mn-cs"/>
+      </a:defRPr>
+    </a:lvl4pPr>
+    <a:lvl5pPr marL="1828800" algn="l" defTabSz="914400" rtl="0" eaLnBrk="1" latinLnBrk="0" hangingPunct="1">
+      <a:defRPr sz="1200" kern="1200">
+        <a:solidFill>
+          <a:schemeClr val="tx1"/>
+        </a:solidFill>
+        <a:latin typeface="+mn-lt"/>
+        <a:ea typeface="+mn-ea"/>
+        <a:cs typeface="+mn-cs"/>
+      </a:defRPr>
+    </a:lvl5pPr>
+    <a:lvl6pPr marL="2286000" algn="l" defTabSz="914400" rtl="0" eaLnBrk="1" latinLnBrk="0" hangingPunct="1">
+      <a:defRPr sz="1200" kern="1200">
+        <a:solidFill>
+          <a:schemeClr val="tx1"/>
+        </a:solidFill>
+        <a:latin typeface="+mn-lt"/>
+        <a:ea typeface="+mn-ea"/>
+        <a:cs typeface="+mn-cs"/>
+      </a:defRPr>
+    </a:lvl6pPr>
+    <a:lvl7pPr marL="2743200" algn="l" defTabSz="914400" rtl="0" eaLnBrk="1" latinLnBrk="0" hangingPunct="1">
+      <a:defRPr sz="1200" kern="1200">
+        <a:solidFill>
+          <a:schemeClr val="tx1"/>
+        </a:solidFill>
+        <a:latin typeface="+mn-lt"/>
+        <a:ea typeface="+mn-ea"/>
+        <a:cs typeface="+mn-cs"/>
+      </a:defRPr>
+    </a:lvl7pPr>
+    <a:lvl8pPr marL="3200400" algn="l" defTabSz="914400" rtl="0" eaLnBrk="1" latinLnBrk="0" hangingPunct="1">
+      <a:defRPr sz="1200" kern="1200">
+        <a:solidFill>
+          <a:schemeClr val="tx1"/>
+        </a:solidFill>
+        <a:latin typeface="+mn-lt"/>
+        <a:ea typeface="+mn-ea"/>
+        <a:cs typeface="+mn-cs"/>
+      </a:defRPr>
+    </a:lvl8pPr>
+    <a:lvl9pPr marL="3657600" algn="l" defTabSz="914400" rtl="0" eaLnBrk="1" latinLnBrk="0" hangingPunct="1">
+      <a:defRPr sz="1200" kern="1200">
+        <a:solidFill>
+          <a:schemeClr val="tx1"/>
+        </a:solidFill>
+        <a:latin typeface="+mn-lt"/>
+        <a:ea typeface="+mn-ea"/>
+        <a:cs typeface="+mn-cs"/>
+      </a:defRPr>
+    </a:lvl9pPr>
+  </p:notesStyle>
+</p:notesMaster>
+</file>
+
+<file path=ppt/notesSlides/notesSlide1.xml><?xml version="1.0" encoding="utf-8"?>
+<p:notes xmlns:a="http://schemas.openxmlformats.org/drawingml/2006/main" xmlns:r="http://schemas.openxmlformats.org/officeDocument/2006/relationships" xmlns:p="http://schemas.openxmlformats.org/presentationml/2006/main">
+  <p:cSld>
+    <p:spTree>
+      <p:nvGrpSpPr>
+        <p:cNvPr id="1" name=""/>
+        <p:cNvGrpSpPr/>
+        <p:nvPr/>
+      </p:nvGrpSpPr>
+      <p:grpSpPr>
+        <a:xfrm>
+          <a:off x="0" y="0"/>
+          <a:ext cx="0" cy="0"/>
+          <a:chOff x="0" y="0"/>
+          <a:chExt cx="0" cy="0"/>
+        </a:xfrm>
+      </p:grpSpPr>
+      <p:sp>
+        <p:nvSpPr>
+          <p:cNvPr id="2" name="Slide Image Placeholder 1"/>
+          <p:cNvSpPr>
+            <a:spLocks noGrp="1" noRot="1" noChangeAspect="1"/>
+          </p:cNvSpPr>
+          <p:nvPr>
+            <p:ph type="sldImg"/>
+          </p:nvPr>
+        </p:nvSpPr>
+        <p:spPr/>
+      </p:sp>
+      <p:sp>
+        <p:nvSpPr>
+          <p:cNvPr id="3" name="Notes Placeholder 2"/>
+          <p:cNvSpPr>
+            <a:spLocks noGrp="1"/>
+          </p:cNvSpPr>
+          <p:nvPr>
+            <p:ph type="body" idx="1"/>
+          </p:nvPr>
+        </p:nvSpPr>
+        <p:spPr/>
+        <p:txBody>
+          <a:bodyPr/>
+          <a:lstStyle/>
+          <a:p>
+            <a:r>
+              <a:rPr lang="en-US" dirty="0"/>
+              <a:t>Updated A and C</a:t>
+            </a:r>
+          </a:p>
+        </p:txBody>
+      </p:sp>
+      <p:sp>
+        <p:nvSpPr>
+          <p:cNvPr id="4" name="Slide Number Placeholder 3"/>
+          <p:cNvSpPr>
+            <a:spLocks noGrp="1"/>
+          </p:cNvSpPr>
+          <p:nvPr>
+            <p:ph type="sldNum" sz="quarter" idx="5"/>
+          </p:nvPr>
+        </p:nvSpPr>
+        <p:spPr/>
+        <p:txBody>
+          <a:bodyPr/>
+          <a:lstStyle/>
+          <a:p>
+            <a:fld id="{50893031-D579-1144-BE45-5A6B0EDFBF8E}" type="slidenum">
+              <a:rPr lang="en-US" smtClean="0"/>
+              <a:t>1</a:t>
+            </a:fld>
+            <a:endParaRPr lang="en-US"/>
+          </a:p>
+        </p:txBody>
+      </p:sp>
+    </p:spTree>
+    <p:extLst>
+      <p:ext uri="{BB962C8B-B14F-4D97-AF65-F5344CB8AC3E}">
+        <p14:creationId xmlns:p14="http://schemas.microsoft.com/office/powerpoint/2010/main" val="1131879708"/>
+      </p:ext>
+    </p:extLst>
+  </p:cSld>
+  <p:clrMapOvr>
+    <a:masterClrMapping/>
+  </p:clrMapOvr>
+</p:notes>
+</file>
+
 <file path=ppt/slideLayouts/slideLayout1.xml><?xml version="1.0" encoding="utf-8"?>
 <p:sldLayout xmlns:a="http://schemas.openxmlformats.org/drawingml/2006/main" xmlns:r="http://schemas.openxmlformats.org/officeDocument/2006/relationships" xmlns:p="http://schemas.openxmlformats.org/presentationml/2006/main" type="title" preserve="1">
   <p:cSld name="Title Slide">
@@ -243,7 +682,7 @@
           <a:p>
             <a:fld id="{66AA9817-0DFB-B440-8114-89C26C8F58BC}" type="datetimeFigureOut">
               <a:rPr lang="en-US" smtClean="0"/>
-              <a:t>11/17/25</a:t>
+              <a:t>11/24/25</a:t>
             </a:fld>
             <a:endParaRPr lang="en-US"/>
           </a:p>
@@ -413,7 +852,7 @@
           <a:p>
             <a:fld id="{66AA9817-0DFB-B440-8114-89C26C8F58BC}" type="datetimeFigureOut">
               <a:rPr lang="en-US" smtClean="0"/>
-              <a:t>11/17/25</a:t>
+              <a:t>11/24/25</a:t>
             </a:fld>
             <a:endParaRPr lang="en-US"/>
           </a:p>
@@ -593,7 +1032,7 @@
           <a:p>
             <a:fld id="{66AA9817-0DFB-B440-8114-89C26C8F58BC}" type="datetimeFigureOut">
               <a:rPr lang="en-US" smtClean="0"/>
-              <a:t>11/17/25</a:t>
+              <a:t>11/24/25</a:t>
             </a:fld>
             <a:endParaRPr lang="en-US"/>
           </a:p>
@@ -763,7 +1202,7 @@
           <a:p>
             <a:fld id="{66AA9817-0DFB-B440-8114-89C26C8F58BC}" type="datetimeFigureOut">
               <a:rPr lang="en-US" smtClean="0"/>
-              <a:t>11/17/25</a:t>
+              <a:t>11/24/25</a:t>
             </a:fld>
             <a:endParaRPr lang="en-US"/>
           </a:p>
@@ -1009,7 +1448,7 @@
           <a:p>
             <a:fld id="{66AA9817-0DFB-B440-8114-89C26C8F58BC}" type="datetimeFigureOut">
               <a:rPr lang="en-US" smtClean="0"/>
-              <a:t>11/17/25</a:t>
+              <a:t>11/24/25</a:t>
             </a:fld>
             <a:endParaRPr lang="en-US"/>
           </a:p>
@@ -1241,7 +1680,7 @@
           <a:p>
             <a:fld id="{66AA9817-0DFB-B440-8114-89C26C8F58BC}" type="datetimeFigureOut">
               <a:rPr lang="en-US" smtClean="0"/>
-              <a:t>11/17/25</a:t>
+              <a:t>11/24/25</a:t>
             </a:fld>
             <a:endParaRPr lang="en-US"/>
           </a:p>
@@ -1608,7 +2047,7 @@
           <a:p>
             <a:fld id="{66AA9817-0DFB-B440-8114-89C26C8F58BC}" type="datetimeFigureOut">
               <a:rPr lang="en-US" smtClean="0"/>
-              <a:t>11/17/25</a:t>
+              <a:t>11/24/25</a:t>
             </a:fld>
             <a:endParaRPr lang="en-US"/>
           </a:p>
@@ -1726,7 +2165,7 @@
           <a:p>
             <a:fld id="{66AA9817-0DFB-B440-8114-89C26C8F58BC}" type="datetimeFigureOut">
               <a:rPr lang="en-US" smtClean="0"/>
-              <a:t>11/17/25</a:t>
+              <a:t>11/24/25</a:t>
             </a:fld>
             <a:endParaRPr lang="en-US"/>
           </a:p>
@@ -1821,7 +2260,7 @@
           <a:p>
             <a:fld id="{66AA9817-0DFB-B440-8114-89C26C8F58BC}" type="datetimeFigureOut">
               <a:rPr lang="en-US" smtClean="0"/>
-              <a:t>11/17/25</a:t>
+              <a:t>11/24/25</a:t>
             </a:fld>
             <a:endParaRPr lang="en-US"/>
           </a:p>
@@ -2098,7 +2537,7 @@
           <a:p>
             <a:fld id="{66AA9817-0DFB-B440-8114-89C26C8F58BC}" type="datetimeFigureOut">
               <a:rPr lang="en-US" smtClean="0"/>
-              <a:t>11/17/25</a:t>
+              <a:t>11/24/25</a:t>
             </a:fld>
             <a:endParaRPr lang="en-US"/>
           </a:p>
@@ -2355,7 +2794,7 @@
           <a:p>
             <a:fld id="{66AA9817-0DFB-B440-8114-89C26C8F58BC}" type="datetimeFigureOut">
               <a:rPr lang="en-US" smtClean="0"/>
-              <a:t>11/17/25</a:t>
+              <a:t>11/24/25</a:t>
             </a:fld>
             <a:endParaRPr lang="en-US"/>
           </a:p>
@@ -2568,7 +3007,7 @@
           <a:p>
             <a:fld id="{66AA9817-0DFB-B440-8114-89C26C8F58BC}" type="datetimeFigureOut">
               <a:rPr lang="en-US" smtClean="0"/>
-              <a:t>11/17/25</a:t>
+              <a:t>11/24/25</a:t>
             </a:fld>
             <a:endParaRPr lang="en-US"/>
           </a:p>
@@ -2975,41 +3414,10 @@
       </p:grpSpPr>
       <p:pic>
         <p:nvPicPr>
-          <p:cNvPr id="5" name="Picture 4">
+          <p:cNvPr id="45" name="Picture 44">
             <a:extLst>
               <a:ext uri="{FF2B5EF4-FFF2-40B4-BE49-F238E27FC236}">
-                <a16:creationId xmlns:a16="http://schemas.microsoft.com/office/drawing/2014/main" id="{7122FCFC-A6AC-E418-E8B2-5FAE114A6043}"/>
-              </a:ext>
-            </a:extLst>
-          </p:cNvPr>
-          <p:cNvPicPr>
-            <a:picLocks noChangeAspect="1"/>
-          </p:cNvPicPr>
-          <p:nvPr/>
-        </p:nvPicPr>
-        <p:blipFill>
-          <a:blip r:embed="rId2"/>
-          <a:srcRect r="21511"/>
-          <a:stretch>
-            <a:fillRect/>
-          </a:stretch>
-        </p:blipFill>
-        <p:spPr>
-          <a:xfrm>
-            <a:off x="631559" y="1059169"/>
-            <a:ext cx="4521559" cy="3291840"/>
-          </a:xfrm>
-          <a:prstGeom prst="rect">
-            <a:avLst/>
-          </a:prstGeom>
-        </p:spPr>
-      </p:pic>
-      <p:pic>
-        <p:nvPicPr>
-          <p:cNvPr id="7" name="Picture 6">
-            <a:extLst>
-              <a:ext uri="{FF2B5EF4-FFF2-40B4-BE49-F238E27FC236}">
-                <a16:creationId xmlns:a16="http://schemas.microsoft.com/office/drawing/2014/main" id="{86379483-D3AC-D93E-3587-683A2D6CBF9C}"/>
+                <a16:creationId xmlns:a16="http://schemas.microsoft.com/office/drawing/2014/main" id="{D51D6863-3AE7-FE04-EDB1-EE8FC1F9710C}"/>
               </a:ext>
             </a:extLst>
           </p:cNvPr>
@@ -3020,630 +3428,26 @@
         </p:nvPicPr>
         <p:blipFill>
           <a:blip r:embed="rId3"/>
-          <a:srcRect r="21511"/>
           <a:stretch>
             <a:fillRect/>
           </a:stretch>
         </p:blipFill>
         <p:spPr>
           <a:xfrm>
-            <a:off x="631559" y="4943355"/>
-            <a:ext cx="4521559" cy="3291840"/>
+            <a:off x="5798869" y="4794527"/>
+            <a:ext cx="5760720" cy="3291840"/>
           </a:xfrm>
           <a:prstGeom prst="rect">
             <a:avLst/>
           </a:prstGeom>
         </p:spPr>
       </p:pic>
-      <p:sp>
-        <p:nvSpPr>
-          <p:cNvPr id="9" name="TextBox 8">
+      <p:pic>
+        <p:nvPicPr>
+          <p:cNvPr id="43" name="Picture 42">
             <a:extLst>
               <a:ext uri="{FF2B5EF4-FFF2-40B4-BE49-F238E27FC236}">
-                <a16:creationId xmlns:a16="http://schemas.microsoft.com/office/drawing/2014/main" id="{9B4381A7-2BB2-5EF7-DB53-0A993AD4140C}"/>
-              </a:ext>
-            </a:extLst>
-          </p:cNvPr>
-          <p:cNvSpPr txBox="1"/>
-          <p:nvPr/>
-        </p:nvSpPr>
-        <p:spPr>
-          <a:xfrm>
-            <a:off x="-339405" y="71476"/>
-            <a:ext cx="6502400" cy="683264"/>
-          </a:xfrm>
-          <a:prstGeom prst="rect">
-            <a:avLst/>
-          </a:prstGeom>
-          <a:noFill/>
-        </p:spPr>
-        <p:txBody>
-          <a:bodyPr wrap="square">
-            <a:spAutoFit/>
-          </a:bodyPr>
-          <a:lstStyle/>
-          <a:p>
-            <a:pPr algn="ctr"/>
-            <a:r>
-              <a:rPr lang="en-US" sz="1920" b="1" dirty="0">
-                <a:latin typeface="Helvetica" pitchFamily="2" charset="0"/>
-              </a:rPr>
-              <a:t>Slopes of Length vs. Genetic Variables and Env. Quantiles</a:t>
-            </a:r>
-          </a:p>
-        </p:txBody>
-      </p:sp>
-      <p:sp>
-        <p:nvSpPr>
-          <p:cNvPr id="10" name="TextBox 9">
-            <a:extLst>
-              <a:ext uri="{FF2B5EF4-FFF2-40B4-BE49-F238E27FC236}">
-                <a16:creationId xmlns:a16="http://schemas.microsoft.com/office/drawing/2014/main" id="{02EC1BC9-CB98-E661-3FEC-3E42CE0E402A}"/>
-              </a:ext>
-            </a:extLst>
-          </p:cNvPr>
-          <p:cNvSpPr txBox="1"/>
-          <p:nvPr/>
-        </p:nvSpPr>
-        <p:spPr>
-          <a:xfrm>
-            <a:off x="5138923" y="516328"/>
-            <a:ext cx="1319892" cy="369332"/>
-          </a:xfrm>
-          <a:prstGeom prst="rect">
-            <a:avLst/>
-          </a:prstGeom>
-          <a:noFill/>
-        </p:spPr>
-        <p:txBody>
-          <a:bodyPr wrap="square" rtlCol="0">
-            <a:spAutoFit/>
-          </a:bodyPr>
-          <a:lstStyle/>
-          <a:p>
-            <a:pPr algn="ctr"/>
-            <a:r>
-              <a:rPr lang="en-US" b="1" u="sng" dirty="0">
-                <a:latin typeface="Helvetica" pitchFamily="2" charset="0"/>
-              </a:rPr>
-              <a:t>Lewisetta</a:t>
-            </a:r>
-          </a:p>
-        </p:txBody>
-      </p:sp>
-      <p:sp>
-        <p:nvSpPr>
-          <p:cNvPr id="11" name="TextBox 10">
-            <a:extLst>
-              <a:ext uri="{FF2B5EF4-FFF2-40B4-BE49-F238E27FC236}">
-                <a16:creationId xmlns:a16="http://schemas.microsoft.com/office/drawing/2014/main" id="{3567526B-1935-E421-D9D7-BD53E608AFEB}"/>
-              </a:ext>
-            </a:extLst>
-          </p:cNvPr>
-          <p:cNvSpPr txBox="1"/>
-          <p:nvPr/>
-        </p:nvSpPr>
-        <p:spPr>
-          <a:xfrm>
-            <a:off x="5029612" y="4482718"/>
-            <a:ext cx="1538514" cy="369332"/>
-          </a:xfrm>
-          <a:prstGeom prst="rect">
-            <a:avLst/>
-          </a:prstGeom>
-          <a:noFill/>
-        </p:spPr>
-        <p:txBody>
-          <a:bodyPr wrap="square" rtlCol="0">
-            <a:spAutoFit/>
-          </a:bodyPr>
-          <a:lstStyle/>
-          <a:p>
-            <a:pPr algn="ctr"/>
-            <a:r>
-              <a:rPr lang="en-US" b="1" u="sng" dirty="0">
-                <a:latin typeface="Helvetica" pitchFamily="2" charset="0"/>
-              </a:rPr>
-              <a:t>York River</a:t>
-            </a:r>
-          </a:p>
-        </p:txBody>
-      </p:sp>
-      <p:sp>
-        <p:nvSpPr>
-          <p:cNvPr id="12" name="TextBox 11">
-            <a:extLst>
-              <a:ext uri="{FF2B5EF4-FFF2-40B4-BE49-F238E27FC236}">
-                <a16:creationId xmlns:a16="http://schemas.microsoft.com/office/drawing/2014/main" id="{B0AAB4DE-C442-A26B-1AD6-D4D67720AE09}"/>
-              </a:ext>
-            </a:extLst>
-          </p:cNvPr>
-          <p:cNvSpPr txBox="1"/>
-          <p:nvPr/>
-        </p:nvSpPr>
-        <p:spPr>
-          <a:xfrm>
-            <a:off x="442199" y="941832"/>
-            <a:ext cx="543698" cy="369332"/>
-          </a:xfrm>
-          <a:prstGeom prst="rect">
-            <a:avLst/>
-          </a:prstGeom>
-          <a:noFill/>
-        </p:spPr>
-        <p:txBody>
-          <a:bodyPr wrap="square" rtlCol="0">
-            <a:spAutoFit/>
-          </a:bodyPr>
-          <a:lstStyle/>
-          <a:p>
-            <a:pPr algn="ctr"/>
-            <a:r>
-              <a:rPr lang="en-US" dirty="0">
-                <a:latin typeface="Helvetica" pitchFamily="2" charset="0"/>
-              </a:rPr>
-              <a:t>A</a:t>
-            </a:r>
-          </a:p>
-        </p:txBody>
-      </p:sp>
-      <p:sp>
-        <p:nvSpPr>
-          <p:cNvPr id="15" name="TextBox 14">
-            <a:extLst>
-              <a:ext uri="{FF2B5EF4-FFF2-40B4-BE49-F238E27FC236}">
-                <a16:creationId xmlns:a16="http://schemas.microsoft.com/office/drawing/2014/main" id="{945A0E04-ECEF-6E58-5F3A-413151264EB1}"/>
-              </a:ext>
-            </a:extLst>
-          </p:cNvPr>
-          <p:cNvSpPr txBox="1"/>
-          <p:nvPr/>
-        </p:nvSpPr>
-        <p:spPr>
-          <a:xfrm>
-            <a:off x="2350020" y="1180084"/>
-            <a:ext cx="855722" cy="237744"/>
-          </a:xfrm>
-          <a:prstGeom prst="rect">
-            <a:avLst/>
-          </a:prstGeom>
-          <a:solidFill>
-            <a:schemeClr val="bg1"/>
-          </a:solidFill>
-        </p:spPr>
-        <p:txBody>
-          <a:bodyPr wrap="square" rtlCol="0">
-            <a:spAutoFit/>
-          </a:bodyPr>
-          <a:lstStyle/>
-          <a:p>
-            <a:r>
-              <a:rPr lang="en-US" sz="1200" dirty="0">
-                <a:solidFill>
-                  <a:srgbClr val="F591B3"/>
-                </a:solidFill>
-              </a:rPr>
-              <a:t>NS</a:t>
-            </a:r>
-          </a:p>
-        </p:txBody>
-      </p:sp>
-      <p:sp>
-        <p:nvSpPr>
-          <p:cNvPr id="18" name="TextBox 17">
-            <a:extLst>
-              <a:ext uri="{FF2B5EF4-FFF2-40B4-BE49-F238E27FC236}">
-                <a16:creationId xmlns:a16="http://schemas.microsoft.com/office/drawing/2014/main" id="{C7D49CEA-4515-A0F1-E2AE-4E48A344F14E}"/>
-              </a:ext>
-            </a:extLst>
-          </p:cNvPr>
-          <p:cNvSpPr txBox="1"/>
-          <p:nvPr/>
-        </p:nvSpPr>
-        <p:spPr>
-          <a:xfrm>
-            <a:off x="2335351" y="2480500"/>
-            <a:ext cx="855722" cy="237744"/>
-          </a:xfrm>
-          <a:prstGeom prst="rect">
-            <a:avLst/>
-          </a:prstGeom>
-          <a:solidFill>
-            <a:schemeClr val="bg1"/>
-          </a:solidFill>
-        </p:spPr>
-        <p:txBody>
-          <a:bodyPr wrap="square" rtlCol="0">
-            <a:spAutoFit/>
-          </a:bodyPr>
-          <a:lstStyle/>
-          <a:p>
-            <a:r>
-              <a:rPr lang="en-US" sz="1200" dirty="0">
-                <a:solidFill>
-                  <a:srgbClr val="F16293"/>
-                </a:solidFill>
-              </a:rPr>
-              <a:t>NS</a:t>
-            </a:r>
-          </a:p>
-        </p:txBody>
-      </p:sp>
-      <p:sp>
-        <p:nvSpPr>
-          <p:cNvPr id="16" name="TextBox 15">
-            <a:extLst>
-              <a:ext uri="{FF2B5EF4-FFF2-40B4-BE49-F238E27FC236}">
-                <a16:creationId xmlns:a16="http://schemas.microsoft.com/office/drawing/2014/main" id="{C5C00162-6462-77A1-710C-E2A91D3EE83E}"/>
-              </a:ext>
-            </a:extLst>
-          </p:cNvPr>
-          <p:cNvSpPr txBox="1"/>
-          <p:nvPr/>
-        </p:nvSpPr>
-        <p:spPr>
-          <a:xfrm>
-            <a:off x="2335351" y="2316967"/>
-            <a:ext cx="855722" cy="237744"/>
-          </a:xfrm>
-          <a:prstGeom prst="rect">
-            <a:avLst/>
-          </a:prstGeom>
-          <a:solidFill>
-            <a:schemeClr val="bg1"/>
-          </a:solidFill>
-        </p:spPr>
-        <p:txBody>
-          <a:bodyPr wrap="square" rtlCol="0">
-            <a:spAutoFit/>
-          </a:bodyPr>
-          <a:lstStyle/>
-          <a:p>
-            <a:r>
-              <a:rPr lang="en-US" sz="1200" dirty="0">
-                <a:solidFill>
-                  <a:srgbClr val="F06F9C"/>
-                </a:solidFill>
-              </a:rPr>
-              <a:t>NS</a:t>
-            </a:r>
-          </a:p>
-        </p:txBody>
-      </p:sp>
-      <p:sp>
-        <p:nvSpPr>
-          <p:cNvPr id="19" name="TextBox 18">
-            <a:extLst>
-              <a:ext uri="{FF2B5EF4-FFF2-40B4-BE49-F238E27FC236}">
-                <a16:creationId xmlns:a16="http://schemas.microsoft.com/office/drawing/2014/main" id="{058C6EC6-3563-EA30-AC71-4D9A70CF679C}"/>
-              </a:ext>
-            </a:extLst>
-          </p:cNvPr>
-          <p:cNvSpPr txBox="1"/>
-          <p:nvPr/>
-        </p:nvSpPr>
-        <p:spPr>
-          <a:xfrm>
-            <a:off x="2335351" y="2935948"/>
-            <a:ext cx="855722" cy="182880"/>
-          </a:xfrm>
-          <a:prstGeom prst="rect">
-            <a:avLst/>
-          </a:prstGeom>
-          <a:solidFill>
-            <a:schemeClr val="bg1"/>
-          </a:solidFill>
-        </p:spPr>
-        <p:txBody>
-          <a:bodyPr wrap="square" rtlCol="0">
-            <a:spAutoFit/>
-          </a:bodyPr>
-          <a:lstStyle/>
-          <a:p>
-            <a:r>
-              <a:rPr lang="en-US" sz="1200" dirty="0">
-                <a:solidFill>
-                  <a:srgbClr val="F06F9C"/>
-                </a:solidFill>
-              </a:rPr>
-              <a:t>NS</a:t>
-            </a:r>
-          </a:p>
-        </p:txBody>
-      </p:sp>
-      <p:sp>
-        <p:nvSpPr>
-          <p:cNvPr id="20" name="TextBox 19">
-            <a:extLst>
-              <a:ext uri="{FF2B5EF4-FFF2-40B4-BE49-F238E27FC236}">
-                <a16:creationId xmlns:a16="http://schemas.microsoft.com/office/drawing/2014/main" id="{7E628C44-207D-101E-E270-8E75B768126D}"/>
-              </a:ext>
-            </a:extLst>
-          </p:cNvPr>
-          <p:cNvSpPr txBox="1"/>
-          <p:nvPr/>
-        </p:nvSpPr>
-        <p:spPr>
-          <a:xfrm>
-            <a:off x="2335351" y="2727154"/>
-            <a:ext cx="855722" cy="237744"/>
-          </a:xfrm>
-          <a:prstGeom prst="rect">
-            <a:avLst/>
-          </a:prstGeom>
-          <a:solidFill>
-            <a:schemeClr val="bg1"/>
-          </a:solidFill>
-        </p:spPr>
-        <p:txBody>
-          <a:bodyPr wrap="square" rtlCol="0">
-            <a:spAutoFit/>
-          </a:bodyPr>
-          <a:lstStyle/>
-          <a:p>
-            <a:r>
-              <a:rPr lang="en-US" sz="1200" dirty="0">
-                <a:solidFill>
-                  <a:srgbClr val="F591B3"/>
-                </a:solidFill>
-              </a:rPr>
-              <a:t>NS</a:t>
-            </a:r>
-          </a:p>
-        </p:txBody>
-      </p:sp>
-      <p:sp>
-        <p:nvSpPr>
-          <p:cNvPr id="17" name="TextBox 16">
-            <a:extLst>
-              <a:ext uri="{FF2B5EF4-FFF2-40B4-BE49-F238E27FC236}">
-                <a16:creationId xmlns:a16="http://schemas.microsoft.com/office/drawing/2014/main" id="{9249A465-EE94-D119-8DC5-A4DD6FDB6112}"/>
-              </a:ext>
-            </a:extLst>
-          </p:cNvPr>
-          <p:cNvSpPr txBox="1"/>
-          <p:nvPr/>
-        </p:nvSpPr>
-        <p:spPr>
-          <a:xfrm>
-            <a:off x="2335351" y="2130022"/>
-            <a:ext cx="914400" cy="237744"/>
-          </a:xfrm>
-          <a:prstGeom prst="rect">
-            <a:avLst/>
-          </a:prstGeom>
-          <a:solidFill>
-            <a:schemeClr val="bg1"/>
-          </a:solidFill>
-        </p:spPr>
-        <p:txBody>
-          <a:bodyPr wrap="square" rtlCol="0">
-            <a:spAutoFit/>
-          </a:bodyPr>
-          <a:lstStyle/>
-          <a:p>
-            <a:r>
-              <a:rPr lang="en-US" sz="1200" dirty="0">
-                <a:solidFill>
-                  <a:srgbClr val="F591B3"/>
-                </a:solidFill>
-              </a:rPr>
-              <a:t>NS</a:t>
-            </a:r>
-          </a:p>
-        </p:txBody>
-      </p:sp>
-      <p:sp>
-        <p:nvSpPr>
-          <p:cNvPr id="22" name="TextBox 21">
-            <a:extLst>
-              <a:ext uri="{FF2B5EF4-FFF2-40B4-BE49-F238E27FC236}">
-                <a16:creationId xmlns:a16="http://schemas.microsoft.com/office/drawing/2014/main" id="{ED6A3FCC-C531-4512-9077-EDC3F8E8AFE4}"/>
-              </a:ext>
-            </a:extLst>
-          </p:cNvPr>
-          <p:cNvSpPr txBox="1"/>
-          <p:nvPr/>
-        </p:nvSpPr>
-        <p:spPr>
-          <a:xfrm>
-            <a:off x="2350020" y="6204588"/>
-            <a:ext cx="855722" cy="237744"/>
-          </a:xfrm>
-          <a:prstGeom prst="rect">
-            <a:avLst/>
-          </a:prstGeom>
-          <a:solidFill>
-            <a:schemeClr val="bg1"/>
-          </a:solidFill>
-        </p:spPr>
-        <p:txBody>
-          <a:bodyPr wrap="square" rtlCol="0">
-            <a:spAutoFit/>
-          </a:bodyPr>
-          <a:lstStyle/>
-          <a:p>
-            <a:r>
-              <a:rPr lang="en-US" sz="1200" dirty="0">
-                <a:solidFill>
-                  <a:srgbClr val="AC5684"/>
-                </a:solidFill>
-              </a:rPr>
-              <a:t>NS</a:t>
-            </a:r>
-          </a:p>
-        </p:txBody>
-      </p:sp>
-      <p:sp>
-        <p:nvSpPr>
-          <p:cNvPr id="21" name="TextBox 20">
-            <a:extLst>
-              <a:ext uri="{FF2B5EF4-FFF2-40B4-BE49-F238E27FC236}">
-                <a16:creationId xmlns:a16="http://schemas.microsoft.com/office/drawing/2014/main" id="{3EC1B7A8-CF65-C608-5C5D-268846F83603}"/>
-              </a:ext>
-            </a:extLst>
-          </p:cNvPr>
-          <p:cNvSpPr txBox="1"/>
-          <p:nvPr/>
-        </p:nvSpPr>
-        <p:spPr>
-          <a:xfrm>
-            <a:off x="2350020" y="5968477"/>
-            <a:ext cx="855722" cy="237744"/>
-          </a:xfrm>
-          <a:prstGeom prst="rect">
-            <a:avLst/>
-          </a:prstGeom>
-          <a:solidFill>
-            <a:schemeClr val="bg1"/>
-          </a:solidFill>
-        </p:spPr>
-        <p:txBody>
-          <a:bodyPr wrap="square" rtlCol="0">
-            <a:spAutoFit/>
-          </a:bodyPr>
-          <a:lstStyle/>
-          <a:p>
-            <a:r>
-              <a:rPr lang="en-US" sz="1200" dirty="0">
-                <a:solidFill>
-                  <a:srgbClr val="C992B1"/>
-                </a:solidFill>
-              </a:rPr>
-              <a:t>NS</a:t>
-            </a:r>
-          </a:p>
-        </p:txBody>
-      </p:sp>
-      <p:sp>
-        <p:nvSpPr>
-          <p:cNvPr id="25" name="TextBox 24">
-            <a:extLst>
-              <a:ext uri="{FF2B5EF4-FFF2-40B4-BE49-F238E27FC236}">
-                <a16:creationId xmlns:a16="http://schemas.microsoft.com/office/drawing/2014/main" id="{6CCD8CD8-AFA5-1FF1-D36D-CE4C0058723A}"/>
-              </a:ext>
-            </a:extLst>
-          </p:cNvPr>
-          <p:cNvSpPr txBox="1"/>
-          <p:nvPr/>
-        </p:nvSpPr>
-        <p:spPr>
-          <a:xfrm>
-            <a:off x="2350020" y="7009500"/>
-            <a:ext cx="855722" cy="237744"/>
-          </a:xfrm>
-          <a:prstGeom prst="rect">
-            <a:avLst/>
-          </a:prstGeom>
-          <a:solidFill>
-            <a:schemeClr val="bg1"/>
-          </a:solidFill>
-        </p:spPr>
-        <p:txBody>
-          <a:bodyPr wrap="square" rtlCol="0">
-            <a:spAutoFit/>
-          </a:bodyPr>
-          <a:lstStyle/>
-          <a:p>
-            <a:r>
-              <a:rPr lang="en-US" sz="1200" dirty="0">
-                <a:solidFill>
-                  <a:srgbClr val="880E4F"/>
-                </a:solidFill>
-              </a:rPr>
-              <a:t>NS</a:t>
-            </a:r>
-          </a:p>
-        </p:txBody>
-      </p:sp>
-      <p:sp>
-        <p:nvSpPr>
-          <p:cNvPr id="24" name="TextBox 23">
-            <a:extLst>
-              <a:ext uri="{FF2B5EF4-FFF2-40B4-BE49-F238E27FC236}">
-                <a16:creationId xmlns:a16="http://schemas.microsoft.com/office/drawing/2014/main" id="{3DF38100-34AB-754A-9FB0-E76B092B2899}"/>
-              </a:ext>
-            </a:extLst>
-          </p:cNvPr>
-          <p:cNvSpPr txBox="1"/>
-          <p:nvPr/>
-        </p:nvSpPr>
-        <p:spPr>
-          <a:xfrm>
-            <a:off x="2350020" y="6811566"/>
-            <a:ext cx="855722" cy="237744"/>
-          </a:xfrm>
-          <a:prstGeom prst="rect">
-            <a:avLst/>
-          </a:prstGeom>
-          <a:solidFill>
-            <a:schemeClr val="bg1"/>
-          </a:solidFill>
-        </p:spPr>
-        <p:txBody>
-          <a:bodyPr wrap="square" rtlCol="0">
-            <a:spAutoFit/>
-          </a:bodyPr>
-          <a:lstStyle/>
-          <a:p>
-            <a:r>
-              <a:rPr lang="en-US" sz="1200" dirty="0">
-                <a:solidFill>
-                  <a:srgbClr val="AC5684"/>
-                </a:solidFill>
-              </a:rPr>
-              <a:t>NS</a:t>
-            </a:r>
-          </a:p>
-        </p:txBody>
-      </p:sp>
-      <p:sp>
-        <p:nvSpPr>
-          <p:cNvPr id="23" name="TextBox 22">
-            <a:extLst>
-              <a:ext uri="{FF2B5EF4-FFF2-40B4-BE49-F238E27FC236}">
-                <a16:creationId xmlns:a16="http://schemas.microsoft.com/office/drawing/2014/main" id="{11E5EEE8-30D3-92AC-9F0B-64C35017E2A3}"/>
-              </a:ext>
-            </a:extLst>
-          </p:cNvPr>
-          <p:cNvSpPr txBox="1"/>
-          <p:nvPr/>
-        </p:nvSpPr>
-        <p:spPr>
-          <a:xfrm>
-            <a:off x="2350020" y="6622737"/>
-            <a:ext cx="855722" cy="237744"/>
-          </a:xfrm>
-          <a:prstGeom prst="rect">
-            <a:avLst/>
-          </a:prstGeom>
-          <a:solidFill>
-            <a:schemeClr val="bg1"/>
-          </a:solidFill>
-        </p:spPr>
-        <p:txBody>
-          <a:bodyPr wrap="square" rtlCol="0">
-            <a:spAutoFit/>
-          </a:bodyPr>
-          <a:lstStyle/>
-          <a:p>
-            <a:r>
-              <a:rPr lang="en-US" sz="1200" dirty="0">
-                <a:solidFill>
-                  <a:srgbClr val="C992B1"/>
-                </a:solidFill>
-              </a:rPr>
-              <a:t>NS</a:t>
-            </a:r>
-          </a:p>
-        </p:txBody>
-      </p:sp>
-      <p:pic>
-        <p:nvPicPr>
-          <p:cNvPr id="3" name="Picture 2">
-            <a:extLst>
-              <a:ext uri="{FF2B5EF4-FFF2-40B4-BE49-F238E27FC236}">
-                <a16:creationId xmlns:a16="http://schemas.microsoft.com/office/drawing/2014/main" id="{A69BEC77-06E7-3040-2641-89C246F7EBD1}"/>
+                <a16:creationId xmlns:a16="http://schemas.microsoft.com/office/drawing/2014/main" id="{053EFB73-2D11-DB3F-36C2-A376BD78AA61}"/>
               </a:ext>
             </a:extLst>
           </p:cNvPr>
@@ -3660,7 +3464,7 @@
         </p:blipFill>
         <p:spPr>
           <a:xfrm>
-            <a:off x="5798869" y="1085672"/>
+            <a:off x="5798869" y="1066549"/>
             <a:ext cx="5760720" cy="3291840"/>
           </a:xfrm>
           <a:prstGeom prst="rect">
@@ -3670,10 +3474,41 @@
       </p:pic>
       <p:pic>
         <p:nvPicPr>
-          <p:cNvPr id="6" name="Picture 5">
+          <p:cNvPr id="41" name="Picture 40">
             <a:extLst>
               <a:ext uri="{FF2B5EF4-FFF2-40B4-BE49-F238E27FC236}">
-                <a16:creationId xmlns:a16="http://schemas.microsoft.com/office/drawing/2014/main" id="{0D7C0286-2125-13AB-C66E-A96BD1C020CD}"/>
+                <a16:creationId xmlns:a16="http://schemas.microsoft.com/office/drawing/2014/main" id="{7EE52958-A580-4701-98F3-083B5D45C1FA}"/>
+              </a:ext>
+            </a:extLst>
+          </p:cNvPr>
+          <p:cNvPicPr>
+            <a:picLocks/>
+          </p:cNvPicPr>
+          <p:nvPr/>
+        </p:nvPicPr>
+        <p:blipFill>
+          <a:blip r:embed="rId5"/>
+          <a:srcRect r="21753"/>
+          <a:stretch>
+            <a:fillRect/>
+          </a:stretch>
+        </p:blipFill>
+        <p:spPr>
+          <a:xfrm>
+            <a:off x="507168" y="4796412"/>
+            <a:ext cx="4544568" cy="3291840"/>
+          </a:xfrm>
+          <a:prstGeom prst="rect">
+            <a:avLst/>
+          </a:prstGeom>
+        </p:spPr>
+      </p:pic>
+      <p:pic>
+        <p:nvPicPr>
+          <p:cNvPr id="4" name="Picture 3">
+            <a:extLst>
+              <a:ext uri="{FF2B5EF4-FFF2-40B4-BE49-F238E27FC236}">
+                <a16:creationId xmlns:a16="http://schemas.microsoft.com/office/drawing/2014/main" id="{80D62617-2674-9069-FEF4-1835D43BD57F}"/>
               </a:ext>
             </a:extLst>
           </p:cNvPr>
@@ -3683,21 +3518,543 @@
           <p:nvPr/>
         </p:nvPicPr>
         <p:blipFill>
-          <a:blip r:embed="rId5"/>
+          <a:blip r:embed="rId6"/>
+          <a:srcRect r="21165"/>
           <a:stretch>
             <a:fillRect/>
           </a:stretch>
         </p:blipFill>
         <p:spPr>
           <a:xfrm>
-            <a:off x="5798869" y="4943355"/>
-            <a:ext cx="5760720" cy="3291840"/>
+            <a:off x="507168" y="1066549"/>
+            <a:ext cx="4541425" cy="3291840"/>
           </a:xfrm>
           <a:prstGeom prst="rect">
             <a:avLst/>
           </a:prstGeom>
         </p:spPr>
       </p:pic>
+      <p:sp>
+        <p:nvSpPr>
+          <p:cNvPr id="9" name="TextBox 8">
+            <a:extLst>
+              <a:ext uri="{FF2B5EF4-FFF2-40B4-BE49-F238E27FC236}">
+                <a16:creationId xmlns:a16="http://schemas.microsoft.com/office/drawing/2014/main" id="{9B4381A7-2BB2-5EF7-DB53-0A993AD4140C}"/>
+              </a:ext>
+            </a:extLst>
+          </p:cNvPr>
+          <p:cNvSpPr txBox="1"/>
+          <p:nvPr/>
+        </p:nvSpPr>
+        <p:spPr>
+          <a:xfrm>
+            <a:off x="-339405" y="71476"/>
+            <a:ext cx="6502400" cy="683264"/>
+          </a:xfrm>
+          <a:prstGeom prst="rect">
+            <a:avLst/>
+          </a:prstGeom>
+          <a:noFill/>
+        </p:spPr>
+        <p:txBody>
+          <a:bodyPr wrap="square">
+            <a:spAutoFit/>
+          </a:bodyPr>
+          <a:lstStyle/>
+          <a:p>
+            <a:pPr algn="ctr"/>
+            <a:r>
+              <a:rPr lang="en-US" sz="1920" b="1" dirty="0">
+                <a:latin typeface="Helvetica" pitchFamily="2" charset="0"/>
+              </a:rPr>
+              <a:t>Slopes of Length vs. Genetic Variables and Env. Quantiles</a:t>
+            </a:r>
+          </a:p>
+        </p:txBody>
+      </p:sp>
+      <p:sp>
+        <p:nvSpPr>
+          <p:cNvPr id="10" name="TextBox 9">
+            <a:extLst>
+              <a:ext uri="{FF2B5EF4-FFF2-40B4-BE49-F238E27FC236}">
+                <a16:creationId xmlns:a16="http://schemas.microsoft.com/office/drawing/2014/main" id="{02EC1BC9-CB98-E661-3FEC-3E42CE0E402A}"/>
+              </a:ext>
+            </a:extLst>
+          </p:cNvPr>
+          <p:cNvSpPr txBox="1"/>
+          <p:nvPr/>
+        </p:nvSpPr>
+        <p:spPr>
+          <a:xfrm>
+            <a:off x="5138923" y="516328"/>
+            <a:ext cx="1319892" cy="369332"/>
+          </a:xfrm>
+          <a:prstGeom prst="rect">
+            <a:avLst/>
+          </a:prstGeom>
+          <a:noFill/>
+        </p:spPr>
+        <p:txBody>
+          <a:bodyPr wrap="square" rtlCol="0">
+            <a:spAutoFit/>
+          </a:bodyPr>
+          <a:lstStyle/>
+          <a:p>
+            <a:pPr algn="ctr"/>
+            <a:r>
+              <a:rPr lang="en-US" b="1" u="sng" dirty="0">
+                <a:latin typeface="Helvetica" pitchFamily="2" charset="0"/>
+              </a:rPr>
+              <a:t>Lewisetta</a:t>
+            </a:r>
+          </a:p>
+        </p:txBody>
+      </p:sp>
+      <p:sp>
+        <p:nvSpPr>
+          <p:cNvPr id="11" name="TextBox 10">
+            <a:extLst>
+              <a:ext uri="{FF2B5EF4-FFF2-40B4-BE49-F238E27FC236}">
+                <a16:creationId xmlns:a16="http://schemas.microsoft.com/office/drawing/2014/main" id="{3567526B-1935-E421-D9D7-BD53E608AFEB}"/>
+              </a:ext>
+            </a:extLst>
+          </p:cNvPr>
+          <p:cNvSpPr txBox="1"/>
+          <p:nvPr/>
+        </p:nvSpPr>
+        <p:spPr>
+          <a:xfrm>
+            <a:off x="5029612" y="4482718"/>
+            <a:ext cx="1538514" cy="369332"/>
+          </a:xfrm>
+          <a:prstGeom prst="rect">
+            <a:avLst/>
+          </a:prstGeom>
+          <a:noFill/>
+        </p:spPr>
+        <p:txBody>
+          <a:bodyPr wrap="square" rtlCol="0">
+            <a:spAutoFit/>
+          </a:bodyPr>
+          <a:lstStyle/>
+          <a:p>
+            <a:pPr algn="ctr"/>
+            <a:r>
+              <a:rPr lang="en-US" b="1" u="sng" dirty="0">
+                <a:latin typeface="Helvetica" pitchFamily="2" charset="0"/>
+              </a:rPr>
+              <a:t>York River</a:t>
+            </a:r>
+          </a:p>
+        </p:txBody>
+      </p:sp>
+      <p:sp>
+        <p:nvSpPr>
+          <p:cNvPr id="12" name="TextBox 11">
+            <a:extLst>
+              <a:ext uri="{FF2B5EF4-FFF2-40B4-BE49-F238E27FC236}">
+                <a16:creationId xmlns:a16="http://schemas.microsoft.com/office/drawing/2014/main" id="{B0AAB4DE-C442-A26B-1AD6-D4D67720AE09}"/>
+              </a:ext>
+            </a:extLst>
+          </p:cNvPr>
+          <p:cNvSpPr txBox="1"/>
+          <p:nvPr/>
+        </p:nvSpPr>
+        <p:spPr>
+          <a:xfrm>
+            <a:off x="442199" y="941832"/>
+            <a:ext cx="543698" cy="369332"/>
+          </a:xfrm>
+          <a:prstGeom prst="rect">
+            <a:avLst/>
+          </a:prstGeom>
+          <a:noFill/>
+        </p:spPr>
+        <p:txBody>
+          <a:bodyPr wrap="square" rtlCol="0">
+            <a:spAutoFit/>
+          </a:bodyPr>
+          <a:lstStyle/>
+          <a:p>
+            <a:pPr algn="ctr"/>
+            <a:r>
+              <a:rPr lang="en-US" dirty="0">
+                <a:latin typeface="Helvetica" pitchFamily="2" charset="0"/>
+              </a:rPr>
+              <a:t>A</a:t>
+            </a:r>
+          </a:p>
+        </p:txBody>
+      </p:sp>
+      <p:sp>
+        <p:nvSpPr>
+          <p:cNvPr id="15" name="TextBox 14">
+            <a:extLst>
+              <a:ext uri="{FF2B5EF4-FFF2-40B4-BE49-F238E27FC236}">
+                <a16:creationId xmlns:a16="http://schemas.microsoft.com/office/drawing/2014/main" id="{945A0E04-ECEF-6E58-5F3A-413151264EB1}"/>
+              </a:ext>
+            </a:extLst>
+          </p:cNvPr>
+          <p:cNvSpPr txBox="1"/>
+          <p:nvPr/>
+        </p:nvSpPr>
+        <p:spPr>
+          <a:xfrm>
+            <a:off x="2248420" y="1180084"/>
+            <a:ext cx="855722" cy="237744"/>
+          </a:xfrm>
+          <a:prstGeom prst="rect">
+            <a:avLst/>
+          </a:prstGeom>
+          <a:solidFill>
+            <a:schemeClr val="bg1"/>
+          </a:solidFill>
+        </p:spPr>
+        <p:txBody>
+          <a:bodyPr wrap="square" rtlCol="0">
+            <a:spAutoFit/>
+          </a:bodyPr>
+          <a:lstStyle/>
+          <a:p>
+            <a:r>
+              <a:rPr lang="en-US" sz="1200" dirty="0">
+                <a:solidFill>
+                  <a:srgbClr val="F591B3"/>
+                </a:solidFill>
+              </a:rPr>
+              <a:t>NS</a:t>
+            </a:r>
+          </a:p>
+        </p:txBody>
+      </p:sp>
+      <p:sp>
+        <p:nvSpPr>
+          <p:cNvPr id="18" name="TextBox 17">
+            <a:extLst>
+              <a:ext uri="{FF2B5EF4-FFF2-40B4-BE49-F238E27FC236}">
+                <a16:creationId xmlns:a16="http://schemas.microsoft.com/office/drawing/2014/main" id="{C7D49CEA-4515-A0F1-E2AE-4E48A344F14E}"/>
+              </a:ext>
+            </a:extLst>
+          </p:cNvPr>
+          <p:cNvSpPr txBox="1"/>
+          <p:nvPr/>
+        </p:nvSpPr>
+        <p:spPr>
+          <a:xfrm>
+            <a:off x="2233751" y="2480500"/>
+            <a:ext cx="855722" cy="237744"/>
+          </a:xfrm>
+          <a:prstGeom prst="rect">
+            <a:avLst/>
+          </a:prstGeom>
+          <a:solidFill>
+            <a:schemeClr val="bg1"/>
+          </a:solidFill>
+        </p:spPr>
+        <p:txBody>
+          <a:bodyPr wrap="square" rtlCol="0">
+            <a:spAutoFit/>
+          </a:bodyPr>
+          <a:lstStyle/>
+          <a:p>
+            <a:r>
+              <a:rPr lang="en-US" sz="1200" dirty="0">
+                <a:solidFill>
+                  <a:srgbClr val="F16293"/>
+                </a:solidFill>
+              </a:rPr>
+              <a:t>NS</a:t>
+            </a:r>
+          </a:p>
+        </p:txBody>
+      </p:sp>
+      <p:sp>
+        <p:nvSpPr>
+          <p:cNvPr id="16" name="TextBox 15">
+            <a:extLst>
+              <a:ext uri="{FF2B5EF4-FFF2-40B4-BE49-F238E27FC236}">
+                <a16:creationId xmlns:a16="http://schemas.microsoft.com/office/drawing/2014/main" id="{C5C00162-6462-77A1-710C-E2A91D3EE83E}"/>
+              </a:ext>
+            </a:extLst>
+          </p:cNvPr>
+          <p:cNvSpPr txBox="1"/>
+          <p:nvPr/>
+        </p:nvSpPr>
+        <p:spPr>
+          <a:xfrm>
+            <a:off x="2233751" y="2316967"/>
+            <a:ext cx="855722" cy="237744"/>
+          </a:xfrm>
+          <a:prstGeom prst="rect">
+            <a:avLst/>
+          </a:prstGeom>
+          <a:solidFill>
+            <a:schemeClr val="bg1"/>
+          </a:solidFill>
+        </p:spPr>
+        <p:txBody>
+          <a:bodyPr wrap="square" rtlCol="0">
+            <a:spAutoFit/>
+          </a:bodyPr>
+          <a:lstStyle/>
+          <a:p>
+            <a:r>
+              <a:rPr lang="en-US" sz="1200" dirty="0">
+                <a:solidFill>
+                  <a:srgbClr val="F06F9C"/>
+                </a:solidFill>
+              </a:rPr>
+              <a:t>NS</a:t>
+            </a:r>
+          </a:p>
+        </p:txBody>
+      </p:sp>
+      <p:sp>
+        <p:nvSpPr>
+          <p:cNvPr id="19" name="TextBox 18">
+            <a:extLst>
+              <a:ext uri="{FF2B5EF4-FFF2-40B4-BE49-F238E27FC236}">
+                <a16:creationId xmlns:a16="http://schemas.microsoft.com/office/drawing/2014/main" id="{058C6EC6-3563-EA30-AC71-4D9A70CF679C}"/>
+              </a:ext>
+            </a:extLst>
+          </p:cNvPr>
+          <p:cNvSpPr txBox="1"/>
+          <p:nvPr/>
+        </p:nvSpPr>
+        <p:spPr>
+          <a:xfrm>
+            <a:off x="2233751" y="2935948"/>
+            <a:ext cx="855722" cy="182880"/>
+          </a:xfrm>
+          <a:prstGeom prst="rect">
+            <a:avLst/>
+          </a:prstGeom>
+          <a:solidFill>
+            <a:schemeClr val="bg1"/>
+          </a:solidFill>
+        </p:spPr>
+        <p:txBody>
+          <a:bodyPr wrap="square" rtlCol="0">
+            <a:spAutoFit/>
+          </a:bodyPr>
+          <a:lstStyle/>
+          <a:p>
+            <a:r>
+              <a:rPr lang="en-US" sz="1200" dirty="0">
+                <a:solidFill>
+                  <a:srgbClr val="F06F9C"/>
+                </a:solidFill>
+              </a:rPr>
+              <a:t>NS</a:t>
+            </a:r>
+          </a:p>
+        </p:txBody>
+      </p:sp>
+      <p:sp>
+        <p:nvSpPr>
+          <p:cNvPr id="20" name="TextBox 19">
+            <a:extLst>
+              <a:ext uri="{FF2B5EF4-FFF2-40B4-BE49-F238E27FC236}">
+                <a16:creationId xmlns:a16="http://schemas.microsoft.com/office/drawing/2014/main" id="{7E628C44-207D-101E-E270-8E75B768126D}"/>
+              </a:ext>
+            </a:extLst>
+          </p:cNvPr>
+          <p:cNvSpPr txBox="1"/>
+          <p:nvPr/>
+        </p:nvSpPr>
+        <p:spPr>
+          <a:xfrm>
+            <a:off x="2233751" y="2757634"/>
+            <a:ext cx="855722" cy="237744"/>
+          </a:xfrm>
+          <a:prstGeom prst="rect">
+            <a:avLst/>
+          </a:prstGeom>
+          <a:solidFill>
+            <a:schemeClr val="bg1"/>
+          </a:solidFill>
+        </p:spPr>
+        <p:txBody>
+          <a:bodyPr wrap="square" rtlCol="0">
+            <a:spAutoFit/>
+          </a:bodyPr>
+          <a:lstStyle/>
+          <a:p>
+            <a:r>
+              <a:rPr lang="en-US" sz="1200" dirty="0">
+                <a:solidFill>
+                  <a:srgbClr val="F591B3"/>
+                </a:solidFill>
+              </a:rPr>
+              <a:t>NS</a:t>
+            </a:r>
+          </a:p>
+        </p:txBody>
+      </p:sp>
+      <p:sp>
+        <p:nvSpPr>
+          <p:cNvPr id="17" name="TextBox 16">
+            <a:extLst>
+              <a:ext uri="{FF2B5EF4-FFF2-40B4-BE49-F238E27FC236}">
+                <a16:creationId xmlns:a16="http://schemas.microsoft.com/office/drawing/2014/main" id="{9249A465-EE94-D119-8DC5-A4DD6FDB6112}"/>
+              </a:ext>
+            </a:extLst>
+          </p:cNvPr>
+          <p:cNvSpPr txBox="1"/>
+          <p:nvPr/>
+        </p:nvSpPr>
+        <p:spPr>
+          <a:xfrm>
+            <a:off x="2233751" y="2130022"/>
+            <a:ext cx="914400" cy="237744"/>
+          </a:xfrm>
+          <a:prstGeom prst="rect">
+            <a:avLst/>
+          </a:prstGeom>
+          <a:solidFill>
+            <a:schemeClr val="bg1"/>
+          </a:solidFill>
+        </p:spPr>
+        <p:txBody>
+          <a:bodyPr wrap="square" rtlCol="0">
+            <a:spAutoFit/>
+          </a:bodyPr>
+          <a:lstStyle/>
+          <a:p>
+            <a:r>
+              <a:rPr lang="en-US" sz="1200" dirty="0">
+                <a:solidFill>
+                  <a:srgbClr val="F591B3"/>
+                </a:solidFill>
+              </a:rPr>
+              <a:t>NS</a:t>
+            </a:r>
+          </a:p>
+        </p:txBody>
+      </p:sp>
+      <p:sp>
+        <p:nvSpPr>
+          <p:cNvPr id="21" name="TextBox 20">
+            <a:extLst>
+              <a:ext uri="{FF2B5EF4-FFF2-40B4-BE49-F238E27FC236}">
+                <a16:creationId xmlns:a16="http://schemas.microsoft.com/office/drawing/2014/main" id="{3EC1B7A8-CF65-C608-5C5D-268846F83603}"/>
+              </a:ext>
+            </a:extLst>
+          </p:cNvPr>
+          <p:cNvSpPr txBox="1"/>
+          <p:nvPr/>
+        </p:nvSpPr>
+        <p:spPr>
+          <a:xfrm>
+            <a:off x="2233751" y="5953629"/>
+            <a:ext cx="855722" cy="237744"/>
+          </a:xfrm>
+          <a:prstGeom prst="rect">
+            <a:avLst/>
+          </a:prstGeom>
+          <a:solidFill>
+            <a:schemeClr val="bg1"/>
+          </a:solidFill>
+        </p:spPr>
+        <p:txBody>
+          <a:bodyPr wrap="square" rtlCol="0">
+            <a:spAutoFit/>
+          </a:bodyPr>
+          <a:lstStyle/>
+          <a:p>
+            <a:r>
+              <a:rPr lang="en-US" sz="1200" dirty="0">
+                <a:solidFill>
+                  <a:srgbClr val="C992B1"/>
+                </a:solidFill>
+              </a:rPr>
+              <a:t>NS</a:t>
+            </a:r>
+          </a:p>
+        </p:txBody>
+      </p:sp>
+      <p:sp>
+        <p:nvSpPr>
+          <p:cNvPr id="25" name="TextBox 24">
+            <a:extLst>
+              <a:ext uri="{FF2B5EF4-FFF2-40B4-BE49-F238E27FC236}">
+                <a16:creationId xmlns:a16="http://schemas.microsoft.com/office/drawing/2014/main" id="{6CCD8CD8-AFA5-1FF1-D36D-CE4C0058723A}"/>
+              </a:ext>
+            </a:extLst>
+          </p:cNvPr>
+          <p:cNvSpPr txBox="1"/>
+          <p:nvPr/>
+        </p:nvSpPr>
+        <p:spPr>
+          <a:xfrm>
+            <a:off x="2233751" y="6811772"/>
+            <a:ext cx="855722" cy="237744"/>
+          </a:xfrm>
+          <a:prstGeom prst="rect">
+            <a:avLst/>
+          </a:prstGeom>
+          <a:solidFill>
+            <a:schemeClr val="bg1"/>
+          </a:solidFill>
+        </p:spPr>
+        <p:txBody>
+          <a:bodyPr wrap="square" rtlCol="0">
+            <a:spAutoFit/>
+          </a:bodyPr>
+          <a:lstStyle/>
+          <a:p>
+            <a:r>
+              <a:rPr lang="en-US" sz="1200" dirty="0">
+                <a:solidFill>
+                  <a:srgbClr val="880E4F"/>
+                </a:solidFill>
+              </a:rPr>
+              <a:t>NS</a:t>
+            </a:r>
+          </a:p>
+        </p:txBody>
+      </p:sp>
+      <p:sp>
+        <p:nvSpPr>
+          <p:cNvPr id="23" name="TextBox 22">
+            <a:extLst>
+              <a:ext uri="{FF2B5EF4-FFF2-40B4-BE49-F238E27FC236}">
+                <a16:creationId xmlns:a16="http://schemas.microsoft.com/office/drawing/2014/main" id="{11E5EEE8-30D3-92AC-9F0B-64C35017E2A3}"/>
+              </a:ext>
+            </a:extLst>
+          </p:cNvPr>
+          <p:cNvSpPr txBox="1"/>
+          <p:nvPr/>
+        </p:nvSpPr>
+        <p:spPr>
+          <a:xfrm>
+            <a:off x="2233751" y="6496129"/>
+            <a:ext cx="855722" cy="237744"/>
+          </a:xfrm>
+          <a:prstGeom prst="rect">
+            <a:avLst/>
+          </a:prstGeom>
+          <a:solidFill>
+            <a:schemeClr val="bg1"/>
+          </a:solidFill>
+        </p:spPr>
+        <p:txBody>
+          <a:bodyPr wrap="square" rtlCol="0">
+            <a:spAutoFit/>
+          </a:bodyPr>
+          <a:lstStyle/>
+          <a:p>
+            <a:r>
+              <a:rPr lang="en-US" sz="1200" dirty="0">
+                <a:solidFill>
+                  <a:srgbClr val="C992B1"/>
+                </a:solidFill>
+              </a:rPr>
+              <a:t>NS</a:t>
+            </a:r>
+          </a:p>
+        </p:txBody>
+      </p:sp>
       <p:sp>
         <p:nvSpPr>
           <p:cNvPr id="8" name="TextBox 7">
@@ -3750,7 +4107,7 @@
         </p:nvSpPr>
         <p:spPr>
           <a:xfrm>
-            <a:off x="7329914" y="7362656"/>
+            <a:off x="7329914" y="7163051"/>
             <a:ext cx="855722" cy="237744"/>
           </a:xfrm>
           <a:prstGeom prst="rect">
@@ -3770,252 +4127,6 @@
               <a:rPr lang="en-US" sz="1200" dirty="0">
                 <a:solidFill>
                   <a:srgbClr val="880E4F"/>
-                </a:solidFill>
-              </a:rPr>
-              <a:t>NS</a:t>
-            </a:r>
-          </a:p>
-        </p:txBody>
-      </p:sp>
-      <p:sp>
-        <p:nvSpPr>
-          <p:cNvPr id="26" name="TextBox 25">
-            <a:extLst>
-              <a:ext uri="{FF2B5EF4-FFF2-40B4-BE49-F238E27FC236}">
-                <a16:creationId xmlns:a16="http://schemas.microsoft.com/office/drawing/2014/main" id="{F86C3A20-6CB3-DB6E-7D16-BD953DFC8FD9}"/>
-              </a:ext>
-            </a:extLst>
-          </p:cNvPr>
-          <p:cNvSpPr txBox="1"/>
-          <p:nvPr/>
-        </p:nvSpPr>
-        <p:spPr>
-          <a:xfrm>
-            <a:off x="7329914" y="7114135"/>
-            <a:ext cx="855722" cy="237744"/>
-          </a:xfrm>
-          <a:prstGeom prst="rect">
-            <a:avLst/>
-          </a:prstGeom>
-          <a:solidFill>
-            <a:schemeClr val="bg1"/>
-          </a:solidFill>
-        </p:spPr>
-        <p:txBody>
-          <a:bodyPr wrap="square" rtlCol="0">
-            <a:spAutoFit/>
-          </a:bodyPr>
-          <a:lstStyle/>
-          <a:p>
-            <a:r>
-              <a:rPr lang="en-US" sz="1200" dirty="0">
-                <a:solidFill>
-                  <a:srgbClr val="AC5684"/>
-                </a:solidFill>
-              </a:rPr>
-              <a:t>NS</a:t>
-            </a:r>
-          </a:p>
-        </p:txBody>
-      </p:sp>
-      <p:sp>
-        <p:nvSpPr>
-          <p:cNvPr id="27" name="TextBox 26">
-            <a:extLst>
-              <a:ext uri="{FF2B5EF4-FFF2-40B4-BE49-F238E27FC236}">
-                <a16:creationId xmlns:a16="http://schemas.microsoft.com/office/drawing/2014/main" id="{310E8215-E746-5D3A-85C0-B07509ED8751}"/>
-              </a:ext>
-            </a:extLst>
-          </p:cNvPr>
-          <p:cNvSpPr txBox="1"/>
-          <p:nvPr/>
-        </p:nvSpPr>
-        <p:spPr>
-          <a:xfrm>
-            <a:off x="7329914" y="6897642"/>
-            <a:ext cx="855722" cy="237744"/>
-          </a:xfrm>
-          <a:prstGeom prst="rect">
-            <a:avLst/>
-          </a:prstGeom>
-          <a:solidFill>
-            <a:schemeClr val="bg1"/>
-          </a:solidFill>
-        </p:spPr>
-        <p:txBody>
-          <a:bodyPr wrap="square" rtlCol="0">
-            <a:spAutoFit/>
-          </a:bodyPr>
-          <a:lstStyle/>
-          <a:p>
-            <a:r>
-              <a:rPr lang="en-US" sz="1200" dirty="0">
-                <a:solidFill>
-                  <a:srgbClr val="C992B1"/>
-                </a:solidFill>
-              </a:rPr>
-              <a:t>NS</a:t>
-            </a:r>
-          </a:p>
-        </p:txBody>
-      </p:sp>
-      <p:sp>
-        <p:nvSpPr>
-          <p:cNvPr id="28" name="TextBox 27">
-            <a:extLst>
-              <a:ext uri="{FF2B5EF4-FFF2-40B4-BE49-F238E27FC236}">
-                <a16:creationId xmlns:a16="http://schemas.microsoft.com/office/drawing/2014/main" id="{E648EE14-5239-7272-BDDC-C101002A1556}"/>
-              </a:ext>
-            </a:extLst>
-          </p:cNvPr>
-          <p:cNvSpPr txBox="1"/>
-          <p:nvPr/>
-        </p:nvSpPr>
-        <p:spPr>
-          <a:xfrm>
-            <a:off x="7329914" y="6260363"/>
-            <a:ext cx="855722" cy="237744"/>
-          </a:xfrm>
-          <a:prstGeom prst="rect">
-            <a:avLst/>
-          </a:prstGeom>
-          <a:solidFill>
-            <a:schemeClr val="bg1"/>
-          </a:solidFill>
-        </p:spPr>
-        <p:txBody>
-          <a:bodyPr wrap="square" rtlCol="0">
-            <a:spAutoFit/>
-          </a:bodyPr>
-          <a:lstStyle/>
-          <a:p>
-            <a:r>
-              <a:rPr lang="en-US" sz="1200" dirty="0">
-                <a:solidFill>
-                  <a:srgbClr val="AC5684"/>
-                </a:solidFill>
-              </a:rPr>
-              <a:t>NS</a:t>
-            </a:r>
-          </a:p>
-        </p:txBody>
-      </p:sp>
-      <p:sp>
-        <p:nvSpPr>
-          <p:cNvPr id="29" name="TextBox 28">
-            <a:extLst>
-              <a:ext uri="{FF2B5EF4-FFF2-40B4-BE49-F238E27FC236}">
-                <a16:creationId xmlns:a16="http://schemas.microsoft.com/office/drawing/2014/main" id="{43CD06E3-BB8F-8D93-90BC-6DFE4A327D72}"/>
-              </a:ext>
-            </a:extLst>
-          </p:cNvPr>
-          <p:cNvSpPr txBox="1"/>
-          <p:nvPr/>
-        </p:nvSpPr>
-        <p:spPr>
-          <a:xfrm>
-            <a:off x="7329914" y="6043870"/>
-            <a:ext cx="855722" cy="237744"/>
-          </a:xfrm>
-          <a:prstGeom prst="rect">
-            <a:avLst/>
-          </a:prstGeom>
-          <a:solidFill>
-            <a:schemeClr val="bg1"/>
-          </a:solidFill>
-        </p:spPr>
-        <p:txBody>
-          <a:bodyPr wrap="square" rtlCol="0">
-            <a:spAutoFit/>
-          </a:bodyPr>
-          <a:lstStyle/>
-          <a:p>
-            <a:r>
-              <a:rPr lang="en-US" sz="1200" dirty="0">
-                <a:solidFill>
-                  <a:srgbClr val="C992B1"/>
-                </a:solidFill>
-              </a:rPr>
-              <a:t>NS</a:t>
-            </a:r>
-          </a:p>
-        </p:txBody>
-      </p:sp>
-      <p:sp>
-        <p:nvSpPr>
-          <p:cNvPr id="30" name="TextBox 29">
-            <a:extLst>
-              <a:ext uri="{FF2B5EF4-FFF2-40B4-BE49-F238E27FC236}">
-                <a16:creationId xmlns:a16="http://schemas.microsoft.com/office/drawing/2014/main" id="{F55E39F3-ECA4-93DB-14F1-313659530C20}"/>
-              </a:ext>
-            </a:extLst>
-          </p:cNvPr>
-          <p:cNvSpPr txBox="1"/>
-          <p:nvPr/>
-        </p:nvSpPr>
-        <p:spPr>
-          <a:xfrm>
-            <a:off x="7329914" y="5391540"/>
-            <a:ext cx="855722" cy="237744"/>
-          </a:xfrm>
-          <a:prstGeom prst="rect">
-            <a:avLst/>
-          </a:prstGeom>
-          <a:solidFill>
-            <a:schemeClr val="bg1"/>
-          </a:solidFill>
-        </p:spPr>
-        <p:txBody>
-          <a:bodyPr wrap="square" rtlCol="0">
-            <a:spAutoFit/>
-          </a:bodyPr>
-          <a:lstStyle/>
-          <a:p>
-            <a:r>
-              <a:rPr lang="en-US" sz="1200" dirty="0">
-                <a:solidFill>
-                  <a:srgbClr val="AC5684"/>
-                </a:solidFill>
-              </a:rPr>
-              <a:t>NS</a:t>
-            </a:r>
-          </a:p>
-        </p:txBody>
-      </p:sp>
-      <p:sp>
-        <p:nvSpPr>
-          <p:cNvPr id="31" name="TextBox 30">
-            <a:extLst>
-              <a:ext uri="{FF2B5EF4-FFF2-40B4-BE49-F238E27FC236}">
-                <a16:creationId xmlns:a16="http://schemas.microsoft.com/office/drawing/2014/main" id="{CDFBEDD4-E83E-E48C-EAEF-D3C6EFB103F2}"/>
-              </a:ext>
-            </a:extLst>
-          </p:cNvPr>
-          <p:cNvSpPr txBox="1"/>
-          <p:nvPr/>
-        </p:nvSpPr>
-        <p:spPr>
-          <a:xfrm>
-            <a:off x="7329914" y="5175047"/>
-            <a:ext cx="855722" cy="237744"/>
-          </a:xfrm>
-          <a:prstGeom prst="rect">
-            <a:avLst/>
-          </a:prstGeom>
-          <a:solidFill>
-            <a:schemeClr val="bg1"/>
-          </a:solidFill>
-        </p:spPr>
-        <p:txBody>
-          <a:bodyPr wrap="square" rtlCol="0">
-            <a:spAutoFit/>
-          </a:bodyPr>
-          <a:lstStyle/>
-          <a:p>
-            <a:r>
-              <a:rPr lang="en-US" sz="1200" dirty="0">
-                <a:solidFill>
-                  <a:srgbClr val="C992B1"/>
                 </a:solidFill>
               </a:rPr>
               <a:t>NS</a:t>
@@ -4098,88 +4209,6 @@
               <a:rPr lang="en-US" sz="1200" dirty="0">
                 <a:solidFill>
                   <a:srgbClr val="F06F9C"/>
-                </a:solidFill>
-              </a:rPr>
-              <a:t>NS</a:t>
-            </a:r>
-          </a:p>
-        </p:txBody>
-      </p:sp>
-      <p:sp>
-        <p:nvSpPr>
-          <p:cNvPr id="34" name="TextBox 33">
-            <a:extLst>
-              <a:ext uri="{FF2B5EF4-FFF2-40B4-BE49-F238E27FC236}">
-                <a16:creationId xmlns:a16="http://schemas.microsoft.com/office/drawing/2014/main" id="{7EBB29CC-16A2-48DB-1E66-37C6D28031EF}"/>
-              </a:ext>
-            </a:extLst>
-          </p:cNvPr>
-          <p:cNvSpPr txBox="1"/>
-          <p:nvPr/>
-        </p:nvSpPr>
-        <p:spPr>
-          <a:xfrm>
-            <a:off x="7329914" y="3070433"/>
-            <a:ext cx="855722" cy="237744"/>
-          </a:xfrm>
-          <a:prstGeom prst="rect">
-            <a:avLst/>
-          </a:prstGeom>
-          <a:solidFill>
-            <a:schemeClr val="bg1"/>
-          </a:solidFill>
-        </p:spPr>
-        <p:txBody>
-          <a:bodyPr wrap="square" rtlCol="0">
-            <a:spAutoFit/>
-          </a:bodyPr>
-          <a:lstStyle/>
-          <a:p>
-            <a:r>
-              <a:rPr lang="en-US" sz="1200" dirty="0">
-                <a:solidFill>
-                  <a:srgbClr val="F591B3"/>
-                </a:solidFill>
-              </a:rPr>
-              <a:t>NS</a:t>
-            </a:r>
-          </a:p>
-        </p:txBody>
-      </p:sp>
-      <p:sp>
-        <p:nvSpPr>
-          <p:cNvPr id="35" name="TextBox 34">
-            <a:extLst>
-              <a:ext uri="{FF2B5EF4-FFF2-40B4-BE49-F238E27FC236}">
-                <a16:creationId xmlns:a16="http://schemas.microsoft.com/office/drawing/2014/main" id="{19DD8B9A-697B-5FCA-C9C2-4B0293B99DEB}"/>
-              </a:ext>
-            </a:extLst>
-          </p:cNvPr>
-          <p:cNvSpPr txBox="1"/>
-          <p:nvPr/>
-        </p:nvSpPr>
-        <p:spPr>
-          <a:xfrm>
-            <a:off x="7329914" y="1298786"/>
-            <a:ext cx="855722" cy="237744"/>
-          </a:xfrm>
-          <a:prstGeom prst="rect">
-            <a:avLst/>
-          </a:prstGeom>
-          <a:solidFill>
-            <a:schemeClr val="bg1"/>
-          </a:solidFill>
-        </p:spPr>
-        <p:txBody>
-          <a:bodyPr wrap="square" rtlCol="0">
-            <a:spAutoFit/>
-          </a:bodyPr>
-          <a:lstStyle/>
-          <a:p>
-            <a:r>
-              <a:rPr lang="en-US" sz="1200" dirty="0">
-                <a:solidFill>
-                  <a:srgbClr val="F591B3"/>
                 </a:solidFill>
               </a:rPr>
               <a:t>NS</a:t>
@@ -4627,4 +4656,319 @@
     </a:ext>
   </a:extLst>
 </a:theme>
+</file>
+
+<file path=ppt/theme/theme2.xml><?xml version="1.0" encoding="utf-8"?>
+<a:theme xmlns:a="http://schemas.openxmlformats.org/drawingml/2006/main" name="Office Theme">
+  <a:themeElements>
+    <a:clrScheme name="Office">
+      <a:dk1>
+        <a:sysClr val="windowText" lastClr="000000"/>
+      </a:dk1>
+      <a:lt1>
+        <a:sysClr val="window" lastClr="FFFFFF"/>
+      </a:lt1>
+      <a:dk2>
+        <a:srgbClr val="0E2841"/>
+      </a:dk2>
+      <a:lt2>
+        <a:srgbClr val="E8E8E8"/>
+      </a:lt2>
+      <a:accent1>
+        <a:srgbClr val="156082"/>
+      </a:accent1>
+      <a:accent2>
+        <a:srgbClr val="E97132"/>
+      </a:accent2>
+      <a:accent3>
+        <a:srgbClr val="196B24"/>
+      </a:accent3>
+      <a:accent4>
+        <a:srgbClr val="0F9ED5"/>
+      </a:accent4>
+      <a:accent5>
+        <a:srgbClr val="A02B93"/>
+      </a:accent5>
+      <a:accent6>
+        <a:srgbClr val="4EA72E"/>
+      </a:accent6>
+      <a:hlink>
+        <a:srgbClr val="467886"/>
+      </a:hlink>
+      <a:folHlink>
+        <a:srgbClr val="96607D"/>
+      </a:folHlink>
+    </a:clrScheme>
+    <a:fontScheme name="Office">
+      <a:majorFont>
+        <a:latin typeface="Aptos Display" panose="02110004020202020204"/>
+        <a:ea typeface=""/>
+        <a:cs typeface=""/>
+        <a:font script="Jpan" typeface="游ゴシック Light"/>
+        <a:font script="Hang" typeface="맑은 고딕"/>
+        <a:font script="Hans" typeface="等线 Light"/>
+        <a:font script="Hant" typeface="新細明體"/>
+        <a:font script="Arab" typeface="Times New Roman"/>
+        <a:font script="Hebr" typeface="Times New Roman"/>
+        <a:font script="Thai" typeface="Angsana New"/>
+        <a:font script="Ethi" typeface="Nyala"/>
+        <a:font script="Beng" typeface="Vrinda"/>
+        <a:font script="Gujr" typeface="Shruti"/>
+        <a:font script="Khmr" typeface="MoolBoran"/>
+        <a:font script="Knda" typeface="Tunga"/>
+        <a:font script="Guru" typeface="Raavi"/>
+        <a:font script="Cans" typeface="Euphemia"/>
+        <a:font script="Cher" typeface="Plantagenet Cherokee"/>
+        <a:font script="Yiii" typeface="Microsoft Yi Baiti"/>
+        <a:font script="Tibt" typeface="Microsoft Himalaya"/>
+        <a:font script="Thaa" typeface="MV Boli"/>
+        <a:font script="Deva" typeface="Mangal"/>
+        <a:font script="Telu" typeface="Gautami"/>
+        <a:font script="Taml" typeface="Latha"/>
+        <a:font script="Syrc" typeface="Estrangelo Edessa"/>
+        <a:font script="Orya" typeface="Kalinga"/>
+        <a:font script="Mlym" typeface="Kartika"/>
+        <a:font script="Laoo" typeface="DokChampa"/>
+        <a:font script="Sinh" typeface="Iskoola Pota"/>
+        <a:font script="Mong" typeface="Mongolian Baiti"/>
+        <a:font script="Viet" typeface="Times New Roman"/>
+        <a:font script="Uigh" typeface="Microsoft Uighur"/>
+        <a:font script="Geor" typeface="Sylfaen"/>
+        <a:font script="Armn" typeface="Arial"/>
+        <a:font script="Bugi" typeface="Leelawadee UI"/>
+        <a:font script="Bopo" typeface="Microsoft JhengHei"/>
+        <a:font script="Java" typeface="Javanese Text"/>
+        <a:font script="Lisu" typeface="Segoe UI"/>
+        <a:font script="Mymr" typeface="Myanmar Text"/>
+        <a:font script="Nkoo" typeface="Ebrima"/>
+        <a:font script="Olck" typeface="Nirmala UI"/>
+        <a:font script="Osma" typeface="Ebrima"/>
+        <a:font script="Phag" typeface="Phagspa"/>
+        <a:font script="Syrn" typeface="Estrangelo Edessa"/>
+        <a:font script="Syrj" typeface="Estrangelo Edessa"/>
+        <a:font script="Syre" typeface="Estrangelo Edessa"/>
+        <a:font script="Sora" typeface="Nirmala UI"/>
+        <a:font script="Tale" typeface="Microsoft Tai Le"/>
+        <a:font script="Talu" typeface="Microsoft New Tai Lue"/>
+        <a:font script="Tfng" typeface="Ebrima"/>
+      </a:majorFont>
+      <a:minorFont>
+        <a:latin typeface="Aptos" panose="02110004020202020204"/>
+        <a:ea typeface=""/>
+        <a:cs typeface=""/>
+        <a:font script="Jpan" typeface="游ゴシック"/>
+        <a:font script="Hang" typeface="맑은 고딕"/>
+        <a:font script="Hans" typeface="等线"/>
+        <a:font script="Hant" typeface="新細明體"/>
+        <a:font script="Arab" typeface="Arial"/>
+        <a:font script="Hebr" typeface="Arial"/>
+        <a:font script="Thai" typeface="Cordia New"/>
+        <a:font script="Ethi" typeface="Nyala"/>
+        <a:font script="Beng" typeface="Vrinda"/>
+        <a:font script="Gujr" typeface="Shruti"/>
+        <a:font script="Khmr" typeface="DaunPenh"/>
+        <a:font script="Knda" typeface="Tunga"/>
+        <a:font script="Guru" typeface="Raavi"/>
+        <a:font script="Cans" typeface="Euphemia"/>
+        <a:font script="Cher" typeface="Plantagenet Cherokee"/>
+        <a:font script="Yiii" typeface="Microsoft Yi Baiti"/>
+        <a:font script="Tibt" typeface="Microsoft Himalaya"/>
+        <a:font script="Thaa" typeface="MV Boli"/>
+        <a:font script="Deva" typeface="Mangal"/>
+        <a:font script="Telu" typeface="Gautami"/>
+        <a:font script="Taml" typeface="Latha"/>
+        <a:font script="Syrc" typeface="Estrangelo Edessa"/>
+        <a:font script="Orya" typeface="Kalinga"/>
+        <a:font script="Mlym" typeface="Kartika"/>
+        <a:font script="Laoo" typeface="DokChampa"/>
+        <a:font script="Sinh" typeface="Iskoola Pota"/>
+        <a:font script="Mong" typeface="Mongolian Baiti"/>
+        <a:font script="Viet" typeface="Arial"/>
+        <a:font script="Uigh" typeface="Microsoft Uighur"/>
+        <a:font script="Geor" typeface="Sylfaen"/>
+        <a:font script="Armn" typeface="Arial"/>
+        <a:font script="Bugi" typeface="Leelawadee UI"/>
+        <a:font script="Bopo" typeface="Microsoft JhengHei"/>
+        <a:font script="Java" typeface="Javanese Text"/>
+        <a:font script="Lisu" typeface="Segoe UI"/>
+        <a:font script="Mymr" typeface="Myanmar Text"/>
+        <a:font script="Nkoo" typeface="Ebrima"/>
+        <a:font script="Olck" typeface="Nirmala UI"/>
+        <a:font script="Osma" typeface="Ebrima"/>
+        <a:font script="Phag" typeface="Phagspa"/>
+        <a:font script="Syrn" typeface="Estrangelo Edessa"/>
+        <a:font script="Syrj" typeface="Estrangelo Edessa"/>
+        <a:font script="Syre" typeface="Estrangelo Edessa"/>
+        <a:font script="Sora" typeface="Nirmala UI"/>
+        <a:font script="Tale" typeface="Microsoft Tai Le"/>
+        <a:font script="Talu" typeface="Microsoft New Tai Lue"/>
+        <a:font script="Tfng" typeface="Ebrima"/>
+      </a:minorFont>
+    </a:fontScheme>
+    <a:fmtScheme name="Office">
+      <a:fillStyleLst>
+        <a:solidFill>
+          <a:schemeClr val="phClr"/>
+        </a:solidFill>
+        <a:gradFill rotWithShape="1">
+          <a:gsLst>
+            <a:gs pos="0">
+              <a:schemeClr val="phClr">
+                <a:lumMod val="110000"/>
+                <a:satMod val="105000"/>
+                <a:tint val="67000"/>
+              </a:schemeClr>
+            </a:gs>
+            <a:gs pos="50000">
+              <a:schemeClr val="phClr">
+                <a:lumMod val="105000"/>
+                <a:satMod val="103000"/>
+                <a:tint val="73000"/>
+              </a:schemeClr>
+            </a:gs>
+            <a:gs pos="100000">
+              <a:schemeClr val="phClr">
+                <a:lumMod val="105000"/>
+                <a:satMod val="109000"/>
+                <a:tint val="81000"/>
+              </a:schemeClr>
+            </a:gs>
+          </a:gsLst>
+          <a:lin ang="5400000" scaled="0"/>
+        </a:gradFill>
+        <a:gradFill rotWithShape="1">
+          <a:gsLst>
+            <a:gs pos="0">
+              <a:schemeClr val="phClr">
+                <a:satMod val="103000"/>
+                <a:lumMod val="102000"/>
+                <a:tint val="94000"/>
+              </a:schemeClr>
+            </a:gs>
+            <a:gs pos="50000">
+              <a:schemeClr val="phClr">
+                <a:satMod val="110000"/>
+                <a:lumMod val="100000"/>
+                <a:shade val="100000"/>
+              </a:schemeClr>
+            </a:gs>
+            <a:gs pos="100000">
+              <a:schemeClr val="phClr">
+                <a:lumMod val="99000"/>
+                <a:satMod val="120000"/>
+                <a:shade val="78000"/>
+              </a:schemeClr>
+            </a:gs>
+          </a:gsLst>
+          <a:lin ang="5400000" scaled="0"/>
+        </a:gradFill>
+      </a:fillStyleLst>
+      <a:lnStyleLst>
+        <a:ln w="12700" cap="flat" cmpd="sng" algn="ctr">
+          <a:solidFill>
+            <a:schemeClr val="phClr"/>
+          </a:solidFill>
+          <a:prstDash val="solid"/>
+          <a:miter lim="800000"/>
+        </a:ln>
+        <a:ln w="19050" cap="flat" cmpd="sng" algn="ctr">
+          <a:solidFill>
+            <a:schemeClr val="phClr"/>
+          </a:solidFill>
+          <a:prstDash val="solid"/>
+          <a:miter lim="800000"/>
+        </a:ln>
+        <a:ln w="25400" cap="flat" cmpd="sng" algn="ctr">
+          <a:solidFill>
+            <a:schemeClr val="phClr"/>
+          </a:solidFill>
+          <a:prstDash val="solid"/>
+          <a:miter lim="800000"/>
+        </a:ln>
+      </a:lnStyleLst>
+      <a:effectStyleLst>
+        <a:effectStyle>
+          <a:effectLst/>
+        </a:effectStyle>
+        <a:effectStyle>
+          <a:effectLst/>
+        </a:effectStyle>
+        <a:effectStyle>
+          <a:effectLst>
+            <a:outerShdw blurRad="57150" dist="19050" dir="5400000" algn="ctr" rotWithShape="0">
+              <a:srgbClr val="000000">
+                <a:alpha val="63000"/>
+              </a:srgbClr>
+            </a:outerShdw>
+          </a:effectLst>
+        </a:effectStyle>
+      </a:effectStyleLst>
+      <a:bgFillStyleLst>
+        <a:solidFill>
+          <a:schemeClr val="phClr"/>
+        </a:solidFill>
+        <a:solidFill>
+          <a:schemeClr val="phClr">
+            <a:tint val="95000"/>
+            <a:satMod val="170000"/>
+          </a:schemeClr>
+        </a:solidFill>
+        <a:gradFill rotWithShape="1">
+          <a:gsLst>
+            <a:gs pos="0">
+              <a:schemeClr val="phClr">
+                <a:tint val="93000"/>
+                <a:satMod val="150000"/>
+                <a:shade val="98000"/>
+                <a:lumMod val="102000"/>
+              </a:schemeClr>
+            </a:gs>
+            <a:gs pos="50000">
+              <a:schemeClr val="phClr">
+                <a:tint val="98000"/>
+                <a:satMod val="130000"/>
+                <a:shade val="90000"/>
+                <a:lumMod val="103000"/>
+              </a:schemeClr>
+            </a:gs>
+            <a:gs pos="100000">
+              <a:schemeClr val="phClr">
+                <a:shade val="63000"/>
+                <a:satMod val="120000"/>
+              </a:schemeClr>
+            </a:gs>
+          </a:gsLst>
+          <a:lin ang="5400000" scaled="0"/>
+        </a:gradFill>
+      </a:bgFillStyleLst>
+    </a:fmtScheme>
+  </a:themeElements>
+  <a:objectDefaults>
+    <a:lnDef>
+      <a:spPr/>
+      <a:bodyPr/>
+      <a:lstStyle/>
+      <a:style>
+        <a:lnRef idx="2">
+          <a:schemeClr val="accent1"/>
+        </a:lnRef>
+        <a:fillRef idx="0">
+          <a:schemeClr val="accent1"/>
+        </a:fillRef>
+        <a:effectRef idx="1">
+          <a:schemeClr val="accent1"/>
+        </a:effectRef>
+        <a:fontRef idx="minor">
+          <a:schemeClr val="tx1"/>
+        </a:fontRef>
+      </a:style>
+    </a:lnDef>
+  </a:objectDefaults>
+  <a:extraClrSchemeLst/>
+  <a:extLst>
+    <a:ext uri="{05A4C25C-085E-4340-85A3-A5531E510DB2}">
+      <thm15:themeFamily xmlns:thm15="http://schemas.microsoft.com/office/thememl/2012/main" name="Office Theme" id="{2E142A2C-CD16-42D6-873A-C26D2A0506FA}" vid="{1BDDFF52-6CD6-40A5-AB3C-68EB2F1E4D0A}"/>
+    </a:ext>
+  </a:extLst>
+</a:theme>
 </file>
</xml_diff>